<commit_message>
New Implementation 1. Added direction vector to translation vector 2. New constructor in FlipBook 3. Added new actions
</commit_message>
<xml_diff>
--- a/images/ReadMeSlides.pptx
+++ b/images/ReadMeSlides.pptx
@@ -3335,8 +3335,8 @@
         </p:nvSpPr>
         <p:spPr>
           <a:xfrm>
-            <a:off x="1540621" y="1320968"/>
-            <a:ext cx="3286477" cy="1015663"/>
+            <a:off x="1462073" y="803901"/>
+            <a:ext cx="4261103" cy="1015663"/>
           </a:xfrm>
           <a:prstGeom prst="rect">
             <a:avLst/>
@@ -3356,7 +3356,7 @@
           <a:p>
             <a:r>
               <a:rPr lang="en-US" sz="6000" dirty="0"/>
-              <a:t>3 * (2 + 1)</a:t>
+              <a:t>3 * (2 + 1) - 4</a:t>
             </a:r>
           </a:p>
         </p:txBody>
@@ -3375,7 +3375,7 @@
         </p:nvSpPr>
         <p:spPr>
           <a:xfrm>
-            <a:off x="7510509" y="1438183"/>
+            <a:off x="6559163" y="2302552"/>
             <a:ext cx="816745" cy="781235"/>
           </a:xfrm>
           <a:prstGeom prst="rect">
@@ -3412,10 +3412,10 @@
       </p:sp>
       <p:sp>
         <p:nvSpPr>
-          <p:cNvPr id="7" name="Rectangle 6">
-            <a:extLst>
-              <a:ext uri="{FF2B5EF4-FFF2-40B4-BE49-F238E27FC236}">
-                <a16:creationId xmlns:a16="http://schemas.microsoft.com/office/drawing/2014/main" id="{6E29E2A9-CA57-4008-A960-7381EEE91F68}"/>
+          <p:cNvPr id="8" name="Rectangle 7">
+            <a:extLst>
+              <a:ext uri="{FF2B5EF4-FFF2-40B4-BE49-F238E27FC236}">
+                <a16:creationId xmlns:a16="http://schemas.microsoft.com/office/drawing/2014/main" id="{C78607E8-BD83-44D1-BC45-8B6C9CED1A5C}"/>
               </a:ext>
             </a:extLst>
           </p:cNvPr>
@@ -3424,7 +3424,7 @@
         </p:nvSpPr>
         <p:spPr>
           <a:xfrm>
-            <a:off x="6266150" y="2921168"/>
+            <a:off x="7856782" y="3809212"/>
             <a:ext cx="816745" cy="781235"/>
           </a:xfrm>
           <a:prstGeom prst="rect">
@@ -3454,17 +3454,61 @@
             <a:pPr algn="ctr"/>
             <a:r>
               <a:rPr lang="en-US" sz="6000" dirty="0"/>
-              <a:t>3</a:t>
-            </a:r>
-          </a:p>
-        </p:txBody>
-      </p:sp>
-      <p:sp>
-        <p:nvSpPr>
-          <p:cNvPr id="8" name="Rectangle 7">
-            <a:extLst>
-              <a:ext uri="{FF2B5EF4-FFF2-40B4-BE49-F238E27FC236}">
-                <a16:creationId xmlns:a16="http://schemas.microsoft.com/office/drawing/2014/main" id="{C78607E8-BD83-44D1-BC45-8B6C9CED1A5C}"/>
+              <a:t>+</a:t>
+            </a:r>
+          </a:p>
+        </p:txBody>
+      </p:sp>
+      <p:cxnSp>
+        <p:nvCxnSpPr>
+          <p:cNvPr id="14" name="Connector: Elbow 13">
+            <a:extLst>
+              <a:ext uri="{FF2B5EF4-FFF2-40B4-BE49-F238E27FC236}">
+                <a16:creationId xmlns:a16="http://schemas.microsoft.com/office/drawing/2014/main" id="{38EABD95-49E9-43CB-B425-81DD3D6D1222}"/>
+              </a:ext>
+            </a:extLst>
+          </p:cNvPr>
+          <p:cNvCxnSpPr>
+            <a:stCxn id="6" idx="2"/>
+            <a:endCxn id="8" idx="0"/>
+          </p:cNvCxnSpPr>
+          <p:nvPr/>
+        </p:nvCxnSpPr>
+        <p:spPr>
+          <a:xfrm rot="16200000" flipH="1">
+            <a:off x="7253633" y="2797689"/>
+            <a:ext cx="725425" cy="1297619"/>
+          </a:xfrm>
+          <a:prstGeom prst="bentConnector3">
+            <a:avLst>
+              <a:gd name="adj1" fmla="val 50050"/>
+            </a:avLst>
+          </a:prstGeom>
+          <a:ln w="25400">
+            <a:tailEnd type="triangle"/>
+          </a:ln>
+        </p:spPr>
+        <p:style>
+          <a:lnRef idx="1">
+            <a:schemeClr val="accent1"/>
+          </a:lnRef>
+          <a:fillRef idx="0">
+            <a:schemeClr val="accent1"/>
+          </a:fillRef>
+          <a:effectRef idx="0">
+            <a:schemeClr val="accent1"/>
+          </a:effectRef>
+          <a:fontRef idx="minor">
+            <a:schemeClr val="tx1"/>
+          </a:fontRef>
+        </p:style>
+      </p:cxnSp>
+      <p:sp>
+        <p:nvSpPr>
+          <p:cNvPr id="32" name="Rectangle 31">
+            <a:extLst>
+              <a:ext uri="{FF2B5EF4-FFF2-40B4-BE49-F238E27FC236}">
+                <a16:creationId xmlns:a16="http://schemas.microsoft.com/office/drawing/2014/main" id="{CA9170B2-A0CC-49CB-AD24-DEE62851C010}"/>
               </a:ext>
             </a:extLst>
           </p:cNvPr>
@@ -3473,7 +3517,7 @@
         </p:nvSpPr>
         <p:spPr>
           <a:xfrm>
-            <a:off x="8808128" y="2944843"/>
+            <a:off x="7856782" y="923969"/>
             <a:ext cx="816745" cy="781235"/>
           </a:xfrm>
           <a:prstGeom prst="rect">
@@ -3503,133 +3547,35 @@
             <a:pPr algn="ctr"/>
             <a:r>
               <a:rPr lang="en-US" sz="6000" dirty="0"/>
-              <a:t>+</a:t>
-            </a:r>
-          </a:p>
-        </p:txBody>
-      </p:sp>
-      <p:sp>
-        <p:nvSpPr>
-          <p:cNvPr id="9" name="Rectangle 8">
-            <a:extLst>
-              <a:ext uri="{FF2B5EF4-FFF2-40B4-BE49-F238E27FC236}">
-                <a16:creationId xmlns:a16="http://schemas.microsoft.com/office/drawing/2014/main" id="{DD6CCF47-73A8-4E7A-A605-F59596764A0A}"/>
-              </a:ext>
-            </a:extLst>
-          </p:cNvPr>
-          <p:cNvSpPr/>
-          <p:nvPr/>
-        </p:nvSpPr>
-        <p:spPr>
-          <a:xfrm>
-            <a:off x="10080594" y="4323424"/>
-            <a:ext cx="816745" cy="781235"/>
-          </a:xfrm>
-          <a:prstGeom prst="rect">
-            <a:avLst/>
-          </a:prstGeom>
-        </p:spPr>
-        <p:style>
-          <a:lnRef idx="2">
-            <a:schemeClr val="accent1">
-              <a:shade val="50000"/>
-            </a:schemeClr>
-          </a:lnRef>
-          <a:fillRef idx="1">
-            <a:schemeClr val="accent1"/>
-          </a:fillRef>
-          <a:effectRef idx="0">
-            <a:schemeClr val="accent1"/>
-          </a:effectRef>
-          <a:fontRef idx="minor">
-            <a:schemeClr val="lt1"/>
-          </a:fontRef>
-        </p:style>
-        <p:txBody>
-          <a:bodyPr rtlCol="0" anchor="ctr"/>
-          <a:lstStyle/>
-          <a:p>
-            <a:pPr algn="ctr"/>
-            <a:r>
-              <a:rPr lang="en-US" sz="6000" dirty="0"/>
-              <a:t>1</a:t>
-            </a:r>
-          </a:p>
-        </p:txBody>
-      </p:sp>
-      <p:sp>
-        <p:nvSpPr>
-          <p:cNvPr id="10" name="Rectangle 9">
-            <a:extLst>
-              <a:ext uri="{FF2B5EF4-FFF2-40B4-BE49-F238E27FC236}">
-                <a16:creationId xmlns:a16="http://schemas.microsoft.com/office/drawing/2014/main" id="{2683DDE5-F66F-4B61-BB0E-366A3A1977C4}"/>
-              </a:ext>
-            </a:extLst>
-          </p:cNvPr>
-          <p:cNvSpPr/>
-          <p:nvPr/>
-        </p:nvSpPr>
-        <p:spPr>
-          <a:xfrm>
-            <a:off x="7572654" y="4323423"/>
-            <a:ext cx="816745" cy="781235"/>
-          </a:xfrm>
-          <a:prstGeom prst="rect">
-            <a:avLst/>
-          </a:prstGeom>
-        </p:spPr>
-        <p:style>
-          <a:lnRef idx="2">
-            <a:schemeClr val="accent1">
-              <a:shade val="50000"/>
-            </a:schemeClr>
-          </a:lnRef>
-          <a:fillRef idx="1">
-            <a:schemeClr val="accent1"/>
-          </a:fillRef>
-          <a:effectRef idx="0">
-            <a:schemeClr val="accent1"/>
-          </a:effectRef>
-          <a:fontRef idx="minor">
-            <a:schemeClr val="lt1"/>
-          </a:fontRef>
-        </p:style>
-        <p:txBody>
-          <a:bodyPr rtlCol="0" anchor="ctr"/>
-          <a:lstStyle/>
-          <a:p>
-            <a:pPr algn="ctr"/>
-            <a:r>
-              <a:rPr lang="en-US" sz="6000" dirty="0"/>
-              <a:t>2</a:t>
+              <a:t>-</a:t>
             </a:r>
           </a:p>
         </p:txBody>
       </p:sp>
       <p:cxnSp>
         <p:nvCxnSpPr>
-          <p:cNvPr id="12" name="Connector: Elbow 11">
-            <a:extLst>
-              <a:ext uri="{FF2B5EF4-FFF2-40B4-BE49-F238E27FC236}">
-                <a16:creationId xmlns:a16="http://schemas.microsoft.com/office/drawing/2014/main" id="{79C02FFE-8592-4FE8-A469-D7EC68B3DBB7}"/>
+          <p:cNvPr id="37" name="Connector: Elbow 36">
+            <a:extLst>
+              <a:ext uri="{FF2B5EF4-FFF2-40B4-BE49-F238E27FC236}">
+                <a16:creationId xmlns:a16="http://schemas.microsoft.com/office/drawing/2014/main" id="{85FEC507-CE3A-4E70-B955-FA4FE62DBF94}"/>
               </a:ext>
             </a:extLst>
           </p:cNvPr>
           <p:cNvCxnSpPr>
-            <a:stCxn id="6" idx="2"/>
-            <a:endCxn id="7" idx="0"/>
+            <a:stCxn id="32" idx="2"/>
+            <a:endCxn id="6" idx="0"/>
           </p:cNvCxnSpPr>
           <p:nvPr/>
         </p:nvCxnSpPr>
         <p:spPr>
           <a:xfrm rot="5400000">
-            <a:off x="6945828" y="1948114"/>
-            <a:ext cx="701750" cy="1244359"/>
+            <a:off x="7317672" y="1355069"/>
+            <a:ext cx="597348" cy="1297619"/>
           </a:xfrm>
           <a:prstGeom prst="bentConnector3">
             <a:avLst/>
           </a:prstGeom>
-          <a:ln>
+          <a:ln w="25400">
             <a:tailEnd type="triangle"/>
           </a:ln>
         </p:spPr>
@@ -3650,30 +3596,328 @@
       </p:cxnSp>
       <p:cxnSp>
         <p:nvCxnSpPr>
-          <p:cNvPr id="14" name="Connector: Elbow 13">
-            <a:extLst>
-              <a:ext uri="{FF2B5EF4-FFF2-40B4-BE49-F238E27FC236}">
-                <a16:creationId xmlns:a16="http://schemas.microsoft.com/office/drawing/2014/main" id="{38EABD95-49E9-43CB-B425-81DD3D6D1222}"/>
+          <p:cNvPr id="41" name="Straight Arrow Connector 40">
+            <a:extLst>
+              <a:ext uri="{FF2B5EF4-FFF2-40B4-BE49-F238E27FC236}">
+                <a16:creationId xmlns:a16="http://schemas.microsoft.com/office/drawing/2014/main" id="{19E49B36-5755-4256-964C-4B6796706608}"/>
+              </a:ext>
+            </a:extLst>
+          </p:cNvPr>
+          <p:cNvCxnSpPr>
+            <a:stCxn id="4" idx="3"/>
+            <a:endCxn id="32" idx="1"/>
+          </p:cNvCxnSpPr>
+          <p:nvPr/>
+        </p:nvCxnSpPr>
+        <p:spPr>
+          <a:xfrm>
+            <a:off x="5723176" y="1311733"/>
+            <a:ext cx="2133606" cy="2854"/>
+          </a:xfrm>
+          <a:prstGeom prst="straightConnector1">
+            <a:avLst/>
+          </a:prstGeom>
+          <a:ln w="25400">
+            <a:tailEnd type="triangle"/>
+          </a:ln>
+        </p:spPr>
+        <p:style>
+          <a:lnRef idx="1">
+            <a:schemeClr val="accent1"/>
+          </a:lnRef>
+          <a:fillRef idx="0">
+            <a:schemeClr val="accent1"/>
+          </a:fillRef>
+          <a:effectRef idx="0">
+            <a:schemeClr val="accent1"/>
+          </a:effectRef>
+          <a:fontRef idx="minor">
+            <a:schemeClr val="tx1"/>
+          </a:fontRef>
+        </p:style>
+      </p:cxnSp>
+      <p:sp>
+        <p:nvSpPr>
+          <p:cNvPr id="42" name="Oval 41">
+            <a:extLst>
+              <a:ext uri="{FF2B5EF4-FFF2-40B4-BE49-F238E27FC236}">
+                <a16:creationId xmlns:a16="http://schemas.microsoft.com/office/drawing/2014/main" id="{2273A9C1-E7A2-4F68-8D3B-BA353C8D49BD}"/>
+              </a:ext>
+            </a:extLst>
+          </p:cNvPr>
+          <p:cNvSpPr/>
+          <p:nvPr/>
+        </p:nvSpPr>
+        <p:spPr>
+          <a:xfrm>
+            <a:off x="5328869" y="3809211"/>
+            <a:ext cx="816744" cy="781235"/>
+          </a:xfrm>
+          <a:prstGeom prst="ellipse">
+            <a:avLst/>
+          </a:prstGeom>
+          <a:solidFill>
+            <a:schemeClr val="tx2">
+              <a:lumMod val="75000"/>
+            </a:schemeClr>
+          </a:solidFill>
+        </p:spPr>
+        <p:style>
+          <a:lnRef idx="2">
+            <a:schemeClr val="accent1">
+              <a:shade val="50000"/>
+            </a:schemeClr>
+          </a:lnRef>
+          <a:fillRef idx="1">
+            <a:schemeClr val="accent1"/>
+          </a:fillRef>
+          <a:effectRef idx="0">
+            <a:schemeClr val="accent1"/>
+          </a:effectRef>
+          <a:fontRef idx="minor">
+            <a:schemeClr val="lt1"/>
+          </a:fontRef>
+        </p:style>
+        <p:txBody>
+          <a:bodyPr rtlCol="0" anchor="ctr"/>
+          <a:lstStyle/>
+          <a:p>
+            <a:pPr algn="ctr"/>
+            <a:r>
+              <a:rPr lang="en-US" sz="6000" dirty="0"/>
+              <a:t>3</a:t>
+            </a:r>
+          </a:p>
+        </p:txBody>
+      </p:sp>
+      <p:cxnSp>
+        <p:nvCxnSpPr>
+          <p:cNvPr id="44" name="Connector: Elbow 43">
+            <a:extLst>
+              <a:ext uri="{FF2B5EF4-FFF2-40B4-BE49-F238E27FC236}">
+                <a16:creationId xmlns:a16="http://schemas.microsoft.com/office/drawing/2014/main" id="{5F725411-35C7-4932-9520-9EFD15D69613}"/>
               </a:ext>
             </a:extLst>
           </p:cNvPr>
           <p:cNvCxnSpPr>
             <a:stCxn id="6" idx="2"/>
-            <a:endCxn id="8" idx="0"/>
+            <a:endCxn id="42" idx="0"/>
+          </p:cNvCxnSpPr>
+          <p:nvPr/>
+        </p:nvCxnSpPr>
+        <p:spPr>
+          <a:xfrm rot="5400000">
+            <a:off x="5989677" y="2831352"/>
+            <a:ext cx="725424" cy="1230295"/>
+          </a:xfrm>
+          <a:prstGeom prst="bentConnector3">
+            <a:avLst/>
+          </a:prstGeom>
+          <a:ln w="25400">
+            <a:tailEnd type="triangle"/>
+          </a:ln>
+        </p:spPr>
+        <p:style>
+          <a:lnRef idx="1">
+            <a:schemeClr val="accent1"/>
+          </a:lnRef>
+          <a:fillRef idx="0">
+            <a:schemeClr val="accent1"/>
+          </a:fillRef>
+          <a:effectRef idx="0">
+            <a:schemeClr val="accent1"/>
+          </a:effectRef>
+          <a:fontRef idx="minor">
+            <a:schemeClr val="tx1"/>
+          </a:fontRef>
+        </p:style>
+      </p:cxnSp>
+      <p:sp>
+        <p:nvSpPr>
+          <p:cNvPr id="46" name="Oval 45">
+            <a:extLst>
+              <a:ext uri="{FF2B5EF4-FFF2-40B4-BE49-F238E27FC236}">
+                <a16:creationId xmlns:a16="http://schemas.microsoft.com/office/drawing/2014/main" id="{4B69AC44-83FE-4239-8846-8C2F9549E5FF}"/>
+              </a:ext>
+            </a:extLst>
+          </p:cNvPr>
+          <p:cNvSpPr/>
+          <p:nvPr/>
+        </p:nvSpPr>
+        <p:spPr>
+          <a:xfrm>
+            <a:off x="6607993" y="5187791"/>
+            <a:ext cx="816744" cy="781235"/>
+          </a:xfrm>
+          <a:prstGeom prst="ellipse">
+            <a:avLst/>
+          </a:prstGeom>
+          <a:solidFill>
+            <a:schemeClr val="tx2">
+              <a:lumMod val="75000"/>
+            </a:schemeClr>
+          </a:solidFill>
+        </p:spPr>
+        <p:style>
+          <a:lnRef idx="2">
+            <a:schemeClr val="accent1">
+              <a:shade val="50000"/>
+            </a:schemeClr>
+          </a:lnRef>
+          <a:fillRef idx="1">
+            <a:schemeClr val="accent1"/>
+          </a:fillRef>
+          <a:effectRef idx="0">
+            <a:schemeClr val="accent1"/>
+          </a:effectRef>
+          <a:fontRef idx="minor">
+            <a:schemeClr val="lt1"/>
+          </a:fontRef>
+        </p:style>
+        <p:txBody>
+          <a:bodyPr rtlCol="0" anchor="ctr"/>
+          <a:lstStyle/>
+          <a:p>
+            <a:pPr algn="ctr"/>
+            <a:r>
+              <a:rPr lang="en-US" sz="6000" dirty="0"/>
+              <a:t>2</a:t>
+            </a:r>
+          </a:p>
+        </p:txBody>
+      </p:sp>
+      <p:sp>
+        <p:nvSpPr>
+          <p:cNvPr id="47" name="Oval 46">
+            <a:extLst>
+              <a:ext uri="{FF2B5EF4-FFF2-40B4-BE49-F238E27FC236}">
+                <a16:creationId xmlns:a16="http://schemas.microsoft.com/office/drawing/2014/main" id="{CEB3DE88-2839-4FB9-BC28-4F07A8DE2ABF}"/>
+              </a:ext>
+            </a:extLst>
+          </p:cNvPr>
+          <p:cNvSpPr/>
+          <p:nvPr/>
+        </p:nvSpPr>
+        <p:spPr>
+          <a:xfrm>
+            <a:off x="9157342" y="5152796"/>
+            <a:ext cx="816744" cy="781235"/>
+          </a:xfrm>
+          <a:prstGeom prst="ellipse">
+            <a:avLst/>
+          </a:prstGeom>
+          <a:solidFill>
+            <a:schemeClr val="tx2">
+              <a:lumMod val="75000"/>
+            </a:schemeClr>
+          </a:solidFill>
+        </p:spPr>
+        <p:style>
+          <a:lnRef idx="2">
+            <a:schemeClr val="accent1">
+              <a:shade val="50000"/>
+            </a:schemeClr>
+          </a:lnRef>
+          <a:fillRef idx="1">
+            <a:schemeClr val="accent1"/>
+          </a:fillRef>
+          <a:effectRef idx="0">
+            <a:schemeClr val="accent1"/>
+          </a:effectRef>
+          <a:fontRef idx="minor">
+            <a:schemeClr val="lt1"/>
+          </a:fontRef>
+        </p:style>
+        <p:txBody>
+          <a:bodyPr rtlCol="0" anchor="ctr"/>
+          <a:lstStyle/>
+          <a:p>
+            <a:pPr algn="ctr"/>
+            <a:r>
+              <a:rPr lang="en-US" sz="6000" dirty="0"/>
+              <a:t>1</a:t>
+            </a:r>
+          </a:p>
+        </p:txBody>
+      </p:sp>
+      <p:sp>
+        <p:nvSpPr>
+          <p:cNvPr id="48" name="Oval 47">
+            <a:extLst>
+              <a:ext uri="{FF2B5EF4-FFF2-40B4-BE49-F238E27FC236}">
+                <a16:creationId xmlns:a16="http://schemas.microsoft.com/office/drawing/2014/main" id="{DB49205A-A5F8-4E06-8EF0-926E912E13D1}"/>
+              </a:ext>
+            </a:extLst>
+          </p:cNvPr>
+          <p:cNvSpPr/>
+          <p:nvPr/>
+        </p:nvSpPr>
+        <p:spPr>
+          <a:xfrm>
+            <a:off x="9157342" y="2302552"/>
+            <a:ext cx="816744" cy="781235"/>
+          </a:xfrm>
+          <a:prstGeom prst="ellipse">
+            <a:avLst/>
+          </a:prstGeom>
+          <a:solidFill>
+            <a:schemeClr val="tx2">
+              <a:lumMod val="75000"/>
+            </a:schemeClr>
+          </a:solidFill>
+        </p:spPr>
+        <p:style>
+          <a:lnRef idx="2">
+            <a:schemeClr val="accent1">
+              <a:shade val="50000"/>
+            </a:schemeClr>
+          </a:lnRef>
+          <a:fillRef idx="1">
+            <a:schemeClr val="accent1"/>
+          </a:fillRef>
+          <a:effectRef idx="0">
+            <a:schemeClr val="accent1"/>
+          </a:effectRef>
+          <a:fontRef idx="minor">
+            <a:schemeClr val="lt1"/>
+          </a:fontRef>
+        </p:style>
+        <p:txBody>
+          <a:bodyPr rtlCol="0" anchor="ctr"/>
+          <a:lstStyle/>
+          <a:p>
+            <a:pPr algn="ctr"/>
+            <a:r>
+              <a:rPr lang="en-US" sz="6000" dirty="0"/>
+              <a:t>4</a:t>
+            </a:r>
+          </a:p>
+        </p:txBody>
+      </p:sp>
+      <p:cxnSp>
+        <p:nvCxnSpPr>
+          <p:cNvPr id="50" name="Connector: Elbow 49">
+            <a:extLst>
+              <a:ext uri="{FF2B5EF4-FFF2-40B4-BE49-F238E27FC236}">
+                <a16:creationId xmlns:a16="http://schemas.microsoft.com/office/drawing/2014/main" id="{7F9C834F-FAC7-40A7-B827-838A1524DB9F}"/>
+              </a:ext>
+            </a:extLst>
+          </p:cNvPr>
+          <p:cNvCxnSpPr>
+            <a:stCxn id="32" idx="2"/>
+            <a:endCxn id="48" idx="0"/>
           </p:cNvCxnSpPr>
           <p:nvPr/>
         </p:nvCxnSpPr>
         <p:spPr>
           <a:xfrm rot="16200000" flipH="1">
-            <a:off x="8204979" y="1933320"/>
-            <a:ext cx="725425" cy="1297619"/>
+            <a:off x="8616760" y="1353598"/>
+            <a:ext cx="597348" cy="1300559"/>
           </a:xfrm>
           <a:prstGeom prst="bentConnector3">
-            <a:avLst>
-              <a:gd name="adj1" fmla="val 48777"/>
-            </a:avLst>
+            <a:avLst/>
           </a:prstGeom>
-          <a:ln>
+          <a:ln w="25400">
             <a:tailEnd type="triangle"/>
           </a:ln>
         </p:spPr>
@@ -3694,30 +3938,28 @@
       </p:cxnSp>
       <p:cxnSp>
         <p:nvCxnSpPr>
-          <p:cNvPr id="18" name="Connector: Elbow 17">
-            <a:extLst>
-              <a:ext uri="{FF2B5EF4-FFF2-40B4-BE49-F238E27FC236}">
-                <a16:creationId xmlns:a16="http://schemas.microsoft.com/office/drawing/2014/main" id="{90E30DA1-0AB4-4E8C-BFFA-E87F27C95FA1}"/>
+          <p:cNvPr id="52" name="Connector: Elbow 51">
+            <a:extLst>
+              <a:ext uri="{FF2B5EF4-FFF2-40B4-BE49-F238E27FC236}">
+                <a16:creationId xmlns:a16="http://schemas.microsoft.com/office/drawing/2014/main" id="{7950947A-943D-46A9-A616-C43C553D7730}"/>
               </a:ext>
             </a:extLst>
           </p:cNvPr>
           <p:cNvCxnSpPr>
             <a:stCxn id="8" idx="2"/>
-            <a:endCxn id="10" idx="0"/>
+            <a:endCxn id="46" idx="0"/>
           </p:cNvCxnSpPr>
           <p:nvPr/>
         </p:nvCxnSpPr>
         <p:spPr>
           <a:xfrm rot="5400000">
-            <a:off x="8300092" y="3407013"/>
-            <a:ext cx="597345" cy="1235474"/>
+            <a:off x="7342088" y="4264724"/>
+            <a:ext cx="597344" cy="1248790"/>
           </a:xfrm>
           <a:prstGeom prst="bentConnector3">
-            <a:avLst>
-              <a:gd name="adj1" fmla="val 48514"/>
-            </a:avLst>
+            <a:avLst/>
           </a:prstGeom>
-          <a:ln>
+          <a:ln w="25400">
             <a:tailEnd type="triangle"/>
           </a:ln>
         </p:spPr>
@@ -3738,70 +3980,28 @@
       </p:cxnSp>
       <p:cxnSp>
         <p:nvCxnSpPr>
-          <p:cNvPr id="20" name="Connector: Elbow 19">
-            <a:extLst>
-              <a:ext uri="{FF2B5EF4-FFF2-40B4-BE49-F238E27FC236}">
-                <a16:creationId xmlns:a16="http://schemas.microsoft.com/office/drawing/2014/main" id="{2E5C56AD-3488-4F92-8AFF-B3AD25091BEB}"/>
+          <p:cNvPr id="54" name="Connector: Elbow 53">
+            <a:extLst>
+              <a:ext uri="{FF2B5EF4-FFF2-40B4-BE49-F238E27FC236}">
+                <a16:creationId xmlns:a16="http://schemas.microsoft.com/office/drawing/2014/main" id="{D63C684A-6E12-4B48-BBD2-A344FADFB4C2}"/>
               </a:ext>
             </a:extLst>
           </p:cNvPr>
           <p:cNvCxnSpPr>
             <a:stCxn id="8" idx="2"/>
-            <a:endCxn id="9" idx="0"/>
+            <a:endCxn id="47" idx="0"/>
           </p:cNvCxnSpPr>
           <p:nvPr/>
         </p:nvCxnSpPr>
         <p:spPr>
           <a:xfrm rot="16200000" flipH="1">
-            <a:off x="9554061" y="3388518"/>
-            <a:ext cx="597346" cy="1272466"/>
+            <a:off x="8634260" y="4221341"/>
+            <a:ext cx="562349" cy="1300559"/>
           </a:xfrm>
           <a:prstGeom prst="bentConnector3">
             <a:avLst>
-              <a:gd name="adj1" fmla="val 48514"/>
+              <a:gd name="adj1" fmla="val 53285"/>
             </a:avLst>
-          </a:prstGeom>
-          <a:ln>
-            <a:tailEnd type="triangle"/>
-          </a:ln>
-        </p:spPr>
-        <p:style>
-          <a:lnRef idx="1">
-            <a:schemeClr val="accent1"/>
-          </a:lnRef>
-          <a:fillRef idx="0">
-            <a:schemeClr val="accent1"/>
-          </a:fillRef>
-          <a:effectRef idx="0">
-            <a:schemeClr val="accent1"/>
-          </a:effectRef>
-          <a:fontRef idx="minor">
-            <a:schemeClr val="tx1"/>
-          </a:fontRef>
-        </p:style>
-      </p:cxnSp>
-      <p:cxnSp>
-        <p:nvCxnSpPr>
-          <p:cNvPr id="28" name="Straight Arrow Connector 27">
-            <a:extLst>
-              <a:ext uri="{FF2B5EF4-FFF2-40B4-BE49-F238E27FC236}">
-                <a16:creationId xmlns:a16="http://schemas.microsoft.com/office/drawing/2014/main" id="{EAB17496-8DAB-4890-8F46-4B87A70574B3}"/>
-              </a:ext>
-            </a:extLst>
-          </p:cNvPr>
-          <p:cNvCxnSpPr>
-            <a:stCxn id="4" idx="3"/>
-            <a:endCxn id="6" idx="1"/>
-          </p:cNvCxnSpPr>
-          <p:nvPr/>
-        </p:nvCxnSpPr>
-        <p:spPr>
-          <a:xfrm>
-            <a:off x="4827098" y="1828800"/>
-            <a:ext cx="2683411" cy="1"/>
-          </a:xfrm>
-          <a:prstGeom prst="straightConnector1">
-            <a:avLst/>
           </a:prstGeom>
           <a:ln w="25400">
             <a:tailEnd type="triangle"/>

</xml_diff>